<commit_message>
Added some of Juddsproject things
</commit_message>
<xml_diff>
--- a/FinalProject/FinalPresentation.pptx
+++ b/FinalProject/FinalPresentation.pptx
@@ -14,7 +14,8 @@
     <p:sldId id="262" r:id="rId8"/>
     <p:sldId id="264" r:id="rId9"/>
     <p:sldId id="263" r:id="rId10"/>
-    <p:sldId id="265" r:id="rId11"/>
+    <p:sldId id="266" r:id="rId11"/>
+    <p:sldId id="265" r:id="rId12"/>
   </p:sldIdLst>
   <p:sldSz cx="12192000" cy="6858000"/>
   <p:notesSz cx="6858000" cy="9144000"/>
@@ -843,7 +844,7 @@
           <a:p>
             <a:fld id="{F2EE3B7B-C7B5-42CF-90CF-67B3D21B2314}" type="datetime1">
               <a:rPr lang="en-US" smtClean="0"/>
-              <a:t>8/10/2024</a:t>
+              <a:t>8/12/2024</a:t>
             </a:fld>
             <a:endParaRPr lang="en-US"/>
           </a:p>
@@ -1097,7 +1098,7 @@
           <a:p>
             <a:fld id="{567E9B64-DC09-41C8-9DE3-DA74AF8D2F97}" type="datetime1">
               <a:rPr lang="en-US" smtClean="0"/>
-              <a:t>8/10/2024</a:t>
+              <a:t>8/12/2024</a:t>
             </a:fld>
             <a:endParaRPr lang="en-US" dirty="0"/>
           </a:p>
@@ -1416,7 +1417,7 @@
           <a:p>
             <a:fld id="{567E9B64-DC09-41C8-9DE3-DA74AF8D2F97}" type="datetime1">
               <a:rPr lang="en-US" smtClean="0"/>
-              <a:t>8/10/2024</a:t>
+              <a:t>8/12/2024</a:t>
             </a:fld>
             <a:endParaRPr lang="en-US" dirty="0"/>
           </a:p>
@@ -1762,7 +1763,7 @@
           <a:p>
             <a:fld id="{567E9B64-DC09-41C8-9DE3-DA74AF8D2F97}" type="datetime1">
               <a:rPr lang="en-US" smtClean="0"/>
-              <a:t>8/10/2024</a:t>
+              <a:t>8/12/2024</a:t>
             </a:fld>
             <a:endParaRPr lang="en-US" dirty="0"/>
           </a:p>
@@ -2081,7 +2082,7 @@
           <a:p>
             <a:fld id="{567E9B64-DC09-41C8-9DE3-DA74AF8D2F97}" type="datetime1">
               <a:rPr lang="en-US" smtClean="0"/>
-              <a:t>8/10/2024</a:t>
+              <a:t>8/12/2024</a:t>
             </a:fld>
             <a:endParaRPr lang="en-US" dirty="0"/>
           </a:p>
@@ -2479,7 +2480,7 @@
           <a:p>
             <a:fld id="{567E9B64-DC09-41C8-9DE3-DA74AF8D2F97}" type="datetime1">
               <a:rPr lang="en-US" smtClean="0"/>
-              <a:t>8/10/2024</a:t>
+              <a:t>8/12/2024</a:t>
             </a:fld>
             <a:endParaRPr lang="en-US" dirty="0"/>
           </a:p>
@@ -2654,7 +2655,7 @@
           <a:p>
             <a:fld id="{6BAD9902-F134-45BD-ABD2-80C28059B090}" type="datetime1">
               <a:rPr lang="en-US" smtClean="0"/>
-              <a:t>8/10/2024</a:t>
+              <a:t>8/12/2024</a:t>
             </a:fld>
             <a:endParaRPr lang="en-US"/>
           </a:p>
@@ -2837,7 +2838,7 @@
           <a:p>
             <a:fld id="{C2B04DB0-379A-41B7-9B29-7F42F0D571D5}" type="datetime1">
               <a:rPr lang="en-US" smtClean="0"/>
-              <a:t>8/10/2024</a:t>
+              <a:t>8/12/2024</a:t>
             </a:fld>
             <a:endParaRPr lang="en-US"/>
           </a:p>
@@ -3016,7 +3017,7 @@
           <a:p>
             <a:fld id="{0F996519-E62D-4F8C-AE1E-36928EC7D15C}" type="datetime1">
               <a:rPr lang="en-US" smtClean="0"/>
-              <a:t>8/10/2024</a:t>
+              <a:t>8/12/2024</a:t>
             </a:fld>
             <a:endParaRPr lang="en-US"/>
           </a:p>
@@ -3266,7 +3267,7 @@
           <a:p>
             <a:fld id="{6477AEB6-FCE1-4CD5-923B-84E54F1460D5}" type="datetime1">
               <a:rPr lang="en-US" smtClean="0"/>
-              <a:t>8/10/2024</a:t>
+              <a:t>8/12/2024</a:t>
             </a:fld>
             <a:endParaRPr lang="en-US"/>
           </a:p>
@@ -3501,7 +3502,7 @@
           <a:p>
             <a:fld id="{96374C2F-71A1-43C9-B2F6-A4FAC8157F1A}" type="datetime1">
               <a:rPr lang="en-US" smtClean="0"/>
-              <a:t>8/10/2024</a:t>
+              <a:t>8/12/2024</a:t>
             </a:fld>
             <a:endParaRPr lang="en-US"/>
           </a:p>
@@ -3878,7 +3879,7 @@
           <a:p>
             <a:fld id="{AD631DCC-9916-4BB7-A2E9-25EC84C740A7}" type="datetime1">
               <a:rPr lang="en-US" smtClean="0"/>
-              <a:t>8/10/2024</a:t>
+              <a:t>8/12/2024</a:t>
             </a:fld>
             <a:endParaRPr lang="en-US"/>
           </a:p>
@@ -4004,7 +4005,7 @@
           <a:p>
             <a:fld id="{AF59146A-335D-4B7F-86AE-5D483B1F631C}" type="datetime1">
               <a:rPr lang="en-US" smtClean="0"/>
-              <a:t>8/10/2024</a:t>
+              <a:t>8/12/2024</a:t>
             </a:fld>
             <a:endParaRPr lang="en-US"/>
           </a:p>
@@ -4102,7 +4103,7 @@
           <a:p>
             <a:fld id="{DD71D8EC-8E17-4CE6-99C2-C22488572868}" type="datetime1">
               <a:rPr lang="en-US" smtClean="0"/>
-              <a:t>8/10/2024</a:t>
+              <a:t>8/12/2024</a:t>
             </a:fld>
             <a:endParaRPr lang="en-US"/>
           </a:p>
@@ -4360,7 +4361,7 @@
           <a:p>
             <a:fld id="{9A750ABA-DFFA-4B13-BB77-624D9164A38B}" type="datetime1">
               <a:rPr lang="en-US" smtClean="0"/>
-              <a:t>8/10/2024</a:t>
+              <a:t>8/12/2024</a:t>
             </a:fld>
             <a:endParaRPr lang="en-US"/>
           </a:p>
@@ -4626,7 +4627,7 @@
           <a:p>
             <a:fld id="{3220A08F-2B1D-4498-A043-7C299B1C2561}" type="datetime1">
               <a:rPr lang="en-US" smtClean="0"/>
-              <a:t>8/10/2024</a:t>
+              <a:t>8/12/2024</a:t>
             </a:fld>
             <a:endParaRPr lang="en-US"/>
           </a:p>
@@ -5372,7 +5373,7 @@
           <a:p>
             <a:fld id="{567E9B64-DC09-41C8-9DE3-DA74AF8D2F97}" type="datetime1">
               <a:rPr lang="en-US" smtClean="0"/>
-              <a:t>8/10/2024</a:t>
+              <a:t>8/12/2024</a:t>
             </a:fld>
             <a:endParaRPr lang="en-US" dirty="0"/>
           </a:p>
@@ -6913,6 +6914,173 @@
       </p:grpSpPr>
       <p:sp>
         <p:nvSpPr>
+          <p:cNvPr id="2" name="Title 1">
+            <a:extLst>
+              <a:ext uri="{FF2B5EF4-FFF2-40B4-BE49-F238E27FC236}">
+                <a16:creationId xmlns:a16="http://schemas.microsoft.com/office/drawing/2014/main" id="{00F7269A-AFE6-2BD2-C68F-FD628F56F3C8}"/>
+              </a:ext>
+            </a:extLst>
+          </p:cNvPr>
+          <p:cNvSpPr>
+            <a:spLocks noGrp="1"/>
+          </p:cNvSpPr>
+          <p:nvPr>
+            <p:ph type="title"/>
+          </p:nvPr>
+        </p:nvSpPr>
+        <p:spPr/>
+        <p:txBody>
+          <a:bodyPr/>
+          <a:lstStyle/>
+          <a:p>
+            <a:r>
+              <a:rPr lang="en-US" dirty="0"/>
+              <a:t>Future Research</a:t>
+            </a:r>
+          </a:p>
+        </p:txBody>
+      </p:sp>
+      <p:sp>
+        <p:nvSpPr>
+          <p:cNvPr id="3" name="Content Placeholder 2">
+            <a:extLst>
+              <a:ext uri="{FF2B5EF4-FFF2-40B4-BE49-F238E27FC236}">
+                <a16:creationId xmlns:a16="http://schemas.microsoft.com/office/drawing/2014/main" id="{3378CDA4-A8B5-CCCF-5C81-98A6C56C4166}"/>
+              </a:ext>
+            </a:extLst>
+          </p:cNvPr>
+          <p:cNvSpPr>
+            <a:spLocks noGrp="1"/>
+          </p:cNvSpPr>
+          <p:nvPr>
+            <p:ph idx="1"/>
+          </p:nvPr>
+        </p:nvSpPr>
+        <p:spPr/>
+        <p:txBody>
+          <a:bodyPr/>
+          <a:lstStyle/>
+          <a:p>
+            <a:r>
+              <a:rPr lang="en-US" dirty="0"/>
+              <a:t>Improved Wing Analysis</a:t>
+            </a:r>
+          </a:p>
+          <a:p>
+            <a:pPr lvl="1"/>
+            <a:r>
+              <a:rPr lang="en-US" dirty="0"/>
+              <a:t>The idea is that I will get a better lift and drag coefficient by using VLM to get the induced angle of attack for small sections of the wing. These angles of attack will then be referenced to the airfoil polars with the induced angle of attack to figure out lift and drag coefficients.</a:t>
+            </a:r>
+          </a:p>
+          <a:p>
+            <a:pPr lvl="1"/>
+            <a:r>
+              <a:rPr lang="en-US" dirty="0"/>
+              <a:t>Issue is that I’m having trouble getting an accurate angle of attack for each wing section. Once that is resolved I can combine this with the Lift </a:t>
+            </a:r>
+            <a:r>
+              <a:rPr lang="en-US" dirty="0" err="1"/>
+              <a:t>Stabilizer’er</a:t>
+            </a:r>
+            <a:r>
+              <a:rPr lang="en-US"/>
+              <a:t>.</a:t>
+            </a:r>
+            <a:endParaRPr lang="en-US" dirty="0"/>
+          </a:p>
+        </p:txBody>
+      </p:sp>
+      <p:sp>
+        <p:nvSpPr>
+          <p:cNvPr id="4" name="Date Placeholder 3">
+            <a:extLst>
+              <a:ext uri="{FF2B5EF4-FFF2-40B4-BE49-F238E27FC236}">
+                <a16:creationId xmlns:a16="http://schemas.microsoft.com/office/drawing/2014/main" id="{8D66101C-D13B-CB74-13E4-8B1B737250EA}"/>
+              </a:ext>
+            </a:extLst>
+          </p:cNvPr>
+          <p:cNvSpPr>
+            <a:spLocks noGrp="1"/>
+          </p:cNvSpPr>
+          <p:nvPr>
+            <p:ph type="dt" sz="half" idx="10"/>
+          </p:nvPr>
+        </p:nvSpPr>
+        <p:spPr/>
+        <p:txBody>
+          <a:bodyPr/>
+          <a:lstStyle/>
+          <a:p>
+            <a:fld id="{0F996519-E62D-4F8C-AE1E-36928EC7D15C}" type="datetime1">
+              <a:rPr lang="en-US" smtClean="0"/>
+              <a:t>8/12/2024</a:t>
+            </a:fld>
+            <a:endParaRPr lang="en-US"/>
+          </a:p>
+        </p:txBody>
+      </p:sp>
+      <p:sp>
+        <p:nvSpPr>
+          <p:cNvPr id="6" name="Slide Number Placeholder 5">
+            <a:extLst>
+              <a:ext uri="{FF2B5EF4-FFF2-40B4-BE49-F238E27FC236}">
+                <a16:creationId xmlns:a16="http://schemas.microsoft.com/office/drawing/2014/main" id="{B6DE823E-4A8B-ABA9-EE54-D17A1994AEEF}"/>
+              </a:ext>
+            </a:extLst>
+          </p:cNvPr>
+          <p:cNvSpPr>
+            <a:spLocks noGrp="1"/>
+          </p:cNvSpPr>
+          <p:nvPr>
+            <p:ph type="sldNum" sz="quarter" idx="12"/>
+          </p:nvPr>
+        </p:nvSpPr>
+        <p:spPr/>
+        <p:txBody>
+          <a:bodyPr/>
+          <a:lstStyle/>
+          <a:p>
+            <a:fld id="{6E91CC32-6A6B-4E2E-BBA1-6864F305DA26}" type="slidenum">
+              <a:rPr lang="en-US" smtClean="0"/>
+              <a:t>10</a:t>
+            </a:fld>
+            <a:endParaRPr lang="en-US"/>
+          </a:p>
+        </p:txBody>
+      </p:sp>
+    </p:spTree>
+    <p:extLst>
+      <p:ext uri="{BB962C8B-B14F-4D97-AF65-F5344CB8AC3E}">
+        <p14:creationId xmlns:p14="http://schemas.microsoft.com/office/powerpoint/2010/main" val="2182483756"/>
+      </p:ext>
+    </p:extLst>
+  </p:cSld>
+  <p:clrMapOvr>
+    <a:masterClrMapping/>
+  </p:clrMapOvr>
+</p:sld>
+</file>
+
+<file path=ppt/slides/slide11.xml><?xml version="1.0" encoding="utf-8"?>
+<p:sld xmlns:a="http://schemas.openxmlformats.org/drawingml/2006/main" xmlns:r="http://schemas.openxmlformats.org/officeDocument/2006/relationships" xmlns:p="http://schemas.openxmlformats.org/presentationml/2006/main">
+  <p:cSld>
+    <p:spTree>
+      <p:nvGrpSpPr>
+        <p:cNvPr id="1" name=""/>
+        <p:cNvGrpSpPr/>
+        <p:nvPr/>
+      </p:nvGrpSpPr>
+      <p:grpSpPr>
+        <a:xfrm>
+          <a:off x="0" y="0"/>
+          <a:ext cx="0" cy="0"/>
+          <a:chOff x="0" y="0"/>
+          <a:chExt cx="0" cy="0"/>
+        </a:xfrm>
+      </p:grpSpPr>
+      <p:sp>
+        <p:nvSpPr>
           <p:cNvPr id="4" name="Date Placeholder 3">
             <a:extLst>
               <a:ext uri="{FF2B5EF4-FFF2-40B4-BE49-F238E27FC236}">
@@ -6934,7 +7102,7 @@
           <a:p>
             <a:fld id="{0F996519-E62D-4F8C-AE1E-36928EC7D15C}" type="datetime1">
               <a:rPr lang="en-US" smtClean="0"/>
-              <a:t>8/10/2024</a:t>
+              <a:t>8/12/2024</a:t>
             </a:fld>
             <a:endParaRPr lang="en-US"/>
           </a:p>
@@ -6963,7 +7131,7 @@
           <a:p>
             <a:fld id="{6E91CC32-6A6B-4E2E-BBA1-6864F305DA26}" type="slidenum">
               <a:rPr lang="en-US" smtClean="0"/>
-              <a:t>10</a:t>
+              <a:t>11</a:t>
             </a:fld>
             <a:endParaRPr lang="en-US"/>
           </a:p>
@@ -7120,7 +7288,7 @@
           <a:p>
             <a:fld id="{0F996519-E62D-4F8C-AE1E-36928EC7D15C}" type="datetime1">
               <a:rPr lang="en-US" smtClean="0"/>
-              <a:t>8/10/2024</a:t>
+              <a:t>8/12/2024</a:t>
             </a:fld>
             <a:endParaRPr lang="en-US" dirty="0"/>
           </a:p>
@@ -7308,7 +7476,7 @@
           <a:p>
             <a:fld id="{0F996519-E62D-4F8C-AE1E-36928EC7D15C}" type="datetime1">
               <a:rPr lang="en-US" smtClean="0"/>
-              <a:t>8/10/2024</a:t>
+              <a:t>8/12/2024</a:t>
             </a:fld>
             <a:endParaRPr lang="en-US"/>
           </a:p>
@@ -7483,7 +7651,7 @@
           <a:p>
             <a:fld id="{0F996519-E62D-4F8C-AE1E-36928EC7D15C}" type="datetime1">
               <a:rPr lang="en-US" smtClean="0"/>
-              <a:t>8/10/2024</a:t>
+              <a:t>8/12/2024</a:t>
             </a:fld>
             <a:endParaRPr lang="en-US"/>
           </a:p>
@@ -7706,7 +7874,7 @@
           <a:p>
             <a:fld id="{0F996519-E62D-4F8C-AE1E-36928EC7D15C}" type="datetime1">
               <a:rPr lang="en-US" smtClean="0"/>
-              <a:t>8/10/2024</a:t>
+              <a:t>8/12/2024</a:t>
             </a:fld>
             <a:endParaRPr lang="en-US"/>
           </a:p>
@@ -7852,7 +8020,7 @@
           <a:p>
             <a:fld id="{0F996519-E62D-4F8C-AE1E-36928EC7D15C}" type="datetime1">
               <a:rPr lang="en-US" smtClean="0"/>
-              <a:t>8/10/2024</a:t>
+              <a:t>8/12/2024</a:t>
             </a:fld>
             <a:endParaRPr lang="en-US"/>
           </a:p>
@@ -8129,37 +8297,9 @@
           <a:p>
             <a:fld id="{0F996519-E62D-4F8C-AE1E-36928EC7D15C}" type="datetime1">
               <a:rPr lang="en-US" smtClean="0"/>
-              <a:t>8/10/2024</a:t>
+              <a:t>8/12/2024</a:t>
             </a:fld>
             <a:endParaRPr lang="en-US"/>
-          </a:p>
-        </p:txBody>
-      </p:sp>
-      <p:sp>
-        <p:nvSpPr>
-          <p:cNvPr id="5" name="Footer Placeholder 4">
-            <a:extLst>
-              <a:ext uri="{FF2B5EF4-FFF2-40B4-BE49-F238E27FC236}">
-                <a16:creationId xmlns:a16="http://schemas.microsoft.com/office/drawing/2014/main" id="{0B86AD1B-C4A1-4FB6-5749-08AE3E06577C}"/>
-              </a:ext>
-            </a:extLst>
-          </p:cNvPr>
-          <p:cNvSpPr>
-            <a:spLocks noGrp="1"/>
-          </p:cNvSpPr>
-          <p:nvPr>
-            <p:ph type="ftr" sz="quarter" idx="11"/>
-          </p:nvPr>
-        </p:nvSpPr>
-        <p:spPr/>
-        <p:txBody>
-          <a:bodyPr/>
-          <a:lstStyle/>
-          <a:p>
-            <a:r>
-              <a:rPr lang="en-US"/>
-              <a:t>Sample Footer Text</a:t>
-            </a:r>
           </a:p>
         </p:txBody>
       </p:sp>
@@ -8377,7 +8517,7 @@
           <a:p>
             <a:fld id="{0F996519-E62D-4F8C-AE1E-36928EC7D15C}" type="datetime1">
               <a:rPr lang="en-US" smtClean="0"/>
-              <a:t>8/10/2024</a:t>
+              <a:t>8/12/2024</a:t>
             </a:fld>
             <a:endParaRPr lang="en-US"/>
           </a:p>
@@ -8493,7 +8633,7 @@
           <a:p>
             <a:fld id="{0F996519-E62D-4F8C-AE1E-36928EC7D15C}" type="datetime1">
               <a:rPr lang="en-US" smtClean="0"/>
-              <a:t>8/10/2024</a:t>
+              <a:t>8/12/2024</a:t>
             </a:fld>
             <a:endParaRPr lang="en-US"/>
           </a:p>

</xml_diff>